<commit_message>
Fix the problems (meeting 12/02/2021)
</commit_message>
<xml_diff>
--- a/Summary.pptx
+++ b/Summary.pptx
@@ -288,7 +288,7 @@
           <a:p>
             <a:fld id="{7A847CFC-816F-41D0-AAC0-9BF4FEBC753E}" type="datetimeFigureOut">
               <a:rPr lang="es-ES" smtClean="0"/>
-              <a:t>01/12/2021</a:t>
+              <a:t>16/12/2021</a:t>
             </a:fld>
             <a:endParaRPr lang="es-ES"/>
           </a:p>
@@ -453,7 +453,7 @@
           <a:p>
             <a:fld id="{7A847CFC-816F-41D0-AAC0-9BF4FEBC753E}" type="datetimeFigureOut">
               <a:rPr lang="es-ES" smtClean="0"/>
-              <a:t>01/12/2021</a:t>
+              <a:t>16/12/2021</a:t>
             </a:fld>
             <a:endParaRPr lang="es-ES"/>
           </a:p>
@@ -628,7 +628,7 @@
           <a:p>
             <a:fld id="{7A847CFC-816F-41D0-AAC0-9BF4FEBC753E}" type="datetimeFigureOut">
               <a:rPr lang="es-ES" smtClean="0"/>
-              <a:t>01/12/2021</a:t>
+              <a:t>16/12/2021</a:t>
             </a:fld>
             <a:endParaRPr lang="es-ES"/>
           </a:p>
@@ -793,7 +793,7 @@
           <a:p>
             <a:fld id="{7A847CFC-816F-41D0-AAC0-9BF4FEBC753E}" type="datetimeFigureOut">
               <a:rPr lang="es-ES" smtClean="0"/>
-              <a:t>01/12/2021</a:t>
+              <a:t>16/12/2021</a:t>
             </a:fld>
             <a:endParaRPr lang="es-ES"/>
           </a:p>
@@ -1034,7 +1034,7 @@
           <a:p>
             <a:fld id="{7A847CFC-816F-41D0-AAC0-9BF4FEBC753E}" type="datetimeFigureOut">
               <a:rPr lang="es-ES" smtClean="0"/>
-              <a:t>01/12/2021</a:t>
+              <a:t>16/12/2021</a:t>
             </a:fld>
             <a:endParaRPr lang="es-ES"/>
           </a:p>
@@ -1317,7 +1317,7 @@
           <a:p>
             <a:fld id="{7A847CFC-816F-41D0-AAC0-9BF4FEBC753E}" type="datetimeFigureOut">
               <a:rPr lang="es-ES" smtClean="0"/>
-              <a:t>01/12/2021</a:t>
+              <a:t>16/12/2021</a:t>
             </a:fld>
             <a:endParaRPr lang="es-ES"/>
           </a:p>
@@ -1734,7 +1734,7 @@
           <a:p>
             <a:fld id="{7A847CFC-816F-41D0-AAC0-9BF4FEBC753E}" type="datetimeFigureOut">
               <a:rPr lang="es-ES" smtClean="0"/>
-              <a:t>01/12/2021</a:t>
+              <a:t>16/12/2021</a:t>
             </a:fld>
             <a:endParaRPr lang="es-ES"/>
           </a:p>
@@ -1847,7 +1847,7 @@
           <a:p>
             <a:fld id="{7A847CFC-816F-41D0-AAC0-9BF4FEBC753E}" type="datetimeFigureOut">
               <a:rPr lang="es-ES" smtClean="0"/>
-              <a:t>01/12/2021</a:t>
+              <a:t>16/12/2021</a:t>
             </a:fld>
             <a:endParaRPr lang="es-ES"/>
           </a:p>
@@ -1937,7 +1937,7 @@
           <a:p>
             <a:fld id="{7A847CFC-816F-41D0-AAC0-9BF4FEBC753E}" type="datetimeFigureOut">
               <a:rPr lang="es-ES" smtClean="0"/>
-              <a:t>01/12/2021</a:t>
+              <a:t>16/12/2021</a:t>
             </a:fld>
             <a:endParaRPr lang="es-ES"/>
           </a:p>
@@ -2209,7 +2209,7 @@
           <a:p>
             <a:fld id="{7A847CFC-816F-41D0-AAC0-9BF4FEBC753E}" type="datetimeFigureOut">
               <a:rPr lang="es-ES" smtClean="0"/>
-              <a:t>01/12/2021</a:t>
+              <a:t>16/12/2021</a:t>
             </a:fld>
             <a:endParaRPr lang="es-ES"/>
           </a:p>
@@ -2457,7 +2457,7 @@
           <a:p>
             <a:fld id="{7A847CFC-816F-41D0-AAC0-9BF4FEBC753E}" type="datetimeFigureOut">
               <a:rPr lang="es-ES" smtClean="0"/>
-              <a:t>01/12/2021</a:t>
+              <a:t>16/12/2021</a:t>
             </a:fld>
             <a:endParaRPr lang="es-ES"/>
           </a:p>
@@ -2665,7 +2665,7 @@
           <a:p>
             <a:fld id="{7A847CFC-816F-41D0-AAC0-9BF4FEBC753E}" type="datetimeFigureOut">
               <a:rPr lang="es-ES" smtClean="0"/>
-              <a:t>01/12/2021</a:t>
+              <a:t>16/12/2021</a:t>
             </a:fld>
             <a:endParaRPr lang="es-ES"/>
           </a:p>
@@ -3422,7 +3422,11 @@
           <a:p>
             <a:r>
               <a:rPr lang="es-ES" sz="1300" b="1" dirty="0" smtClean="0"/>
-              <a:t>PD_table_complete.py</a:t>
+              <a:t>pd</a:t>
+            </a:r>
+            <a:r>
+              <a:rPr lang="es-ES" sz="1300" b="1" dirty="0" smtClean="0"/>
+              <a:t>_table_complete.py</a:t>
             </a:r>
             <a:endParaRPr lang="en-US" sz="1300" b="1" dirty="0"/>
           </a:p>
@@ -3736,7 +3740,11 @@
           <a:p>
             <a:r>
               <a:rPr lang="es-ES" sz="1300" b="1" dirty="0" smtClean="0"/>
-              <a:t>PD_table_selection.py</a:t>
+              <a:t>pd</a:t>
+            </a:r>
+            <a:r>
+              <a:rPr lang="es-ES" sz="1300" b="1" dirty="0" smtClean="0"/>
+              <a:t>_table_selection.py</a:t>
             </a:r>
             <a:endParaRPr lang="en-US" sz="1300" b="1" dirty="0"/>
           </a:p>
@@ -3832,7 +3840,11 @@
           <a:p>
             <a:r>
               <a:rPr lang="es-ES" sz="1300" b="1" dirty="0" smtClean="0"/>
-              <a:t>PD_MALDI_match.py</a:t>
+              <a:t>pd</a:t>
+            </a:r>
+            <a:r>
+              <a:rPr lang="es-ES" sz="1300" b="1" dirty="0" smtClean="0"/>
+              <a:t>_MALDI_match.py</a:t>
             </a:r>
             <a:endParaRPr lang="en-US" sz="1300" b="1" dirty="0"/>
           </a:p>
@@ -3964,7 +3976,7 @@
           <a:p>
             <a:r>
               <a:rPr lang="es-ES" sz="1300" b="1" dirty="0" smtClean="0"/>
-              <a:t>PD_table_complete.py</a:t>
+              <a:t>load_archives.py</a:t>
             </a:r>
             <a:endParaRPr lang="en-US" sz="1300" b="1" dirty="0"/>
           </a:p>

</xml_diff>

<commit_message>
Functions with all developed options
In these functions, the program has the posibility of doing different methodologies for choosing the peptides unique or non-uniques
</commit_message>
<xml_diff>
--- a/Summary.pptx
+++ b/Summary.pptx
@@ -288,7 +288,7 @@
           <a:p>
             <a:fld id="{7A847CFC-816F-41D0-AAC0-9BF4FEBC753E}" type="datetimeFigureOut">
               <a:rPr lang="es-ES" smtClean="0"/>
-              <a:t>16/12/2021</a:t>
+              <a:t>08/02/2022</a:t>
             </a:fld>
             <a:endParaRPr lang="es-ES"/>
           </a:p>
@@ -453,7 +453,7 @@
           <a:p>
             <a:fld id="{7A847CFC-816F-41D0-AAC0-9BF4FEBC753E}" type="datetimeFigureOut">
               <a:rPr lang="es-ES" smtClean="0"/>
-              <a:t>16/12/2021</a:t>
+              <a:t>08/02/2022</a:t>
             </a:fld>
             <a:endParaRPr lang="es-ES"/>
           </a:p>
@@ -628,7 +628,7 @@
           <a:p>
             <a:fld id="{7A847CFC-816F-41D0-AAC0-9BF4FEBC753E}" type="datetimeFigureOut">
               <a:rPr lang="es-ES" smtClean="0"/>
-              <a:t>16/12/2021</a:t>
+              <a:t>08/02/2022</a:t>
             </a:fld>
             <a:endParaRPr lang="es-ES"/>
           </a:p>
@@ -793,7 +793,7 @@
           <a:p>
             <a:fld id="{7A847CFC-816F-41D0-AAC0-9BF4FEBC753E}" type="datetimeFigureOut">
               <a:rPr lang="es-ES" smtClean="0"/>
-              <a:t>16/12/2021</a:t>
+              <a:t>08/02/2022</a:t>
             </a:fld>
             <a:endParaRPr lang="es-ES"/>
           </a:p>
@@ -1034,7 +1034,7 @@
           <a:p>
             <a:fld id="{7A847CFC-816F-41D0-AAC0-9BF4FEBC753E}" type="datetimeFigureOut">
               <a:rPr lang="es-ES" smtClean="0"/>
-              <a:t>16/12/2021</a:t>
+              <a:t>08/02/2022</a:t>
             </a:fld>
             <a:endParaRPr lang="es-ES"/>
           </a:p>
@@ -1317,7 +1317,7 @@
           <a:p>
             <a:fld id="{7A847CFC-816F-41D0-AAC0-9BF4FEBC753E}" type="datetimeFigureOut">
               <a:rPr lang="es-ES" smtClean="0"/>
-              <a:t>16/12/2021</a:t>
+              <a:t>08/02/2022</a:t>
             </a:fld>
             <a:endParaRPr lang="es-ES"/>
           </a:p>
@@ -1734,7 +1734,7 @@
           <a:p>
             <a:fld id="{7A847CFC-816F-41D0-AAC0-9BF4FEBC753E}" type="datetimeFigureOut">
               <a:rPr lang="es-ES" smtClean="0"/>
-              <a:t>16/12/2021</a:t>
+              <a:t>08/02/2022</a:t>
             </a:fld>
             <a:endParaRPr lang="es-ES"/>
           </a:p>
@@ -1847,7 +1847,7 @@
           <a:p>
             <a:fld id="{7A847CFC-816F-41D0-AAC0-9BF4FEBC753E}" type="datetimeFigureOut">
               <a:rPr lang="es-ES" smtClean="0"/>
-              <a:t>16/12/2021</a:t>
+              <a:t>08/02/2022</a:t>
             </a:fld>
             <a:endParaRPr lang="es-ES"/>
           </a:p>
@@ -1937,7 +1937,7 @@
           <a:p>
             <a:fld id="{7A847CFC-816F-41D0-AAC0-9BF4FEBC753E}" type="datetimeFigureOut">
               <a:rPr lang="es-ES" smtClean="0"/>
-              <a:t>16/12/2021</a:t>
+              <a:t>08/02/2022</a:t>
             </a:fld>
             <a:endParaRPr lang="es-ES"/>
           </a:p>
@@ -2209,7 +2209,7 @@
           <a:p>
             <a:fld id="{7A847CFC-816F-41D0-AAC0-9BF4FEBC753E}" type="datetimeFigureOut">
               <a:rPr lang="es-ES" smtClean="0"/>
-              <a:t>16/12/2021</a:t>
+              <a:t>08/02/2022</a:t>
             </a:fld>
             <a:endParaRPr lang="es-ES"/>
           </a:p>
@@ -2457,7 +2457,7 @@
           <a:p>
             <a:fld id="{7A847CFC-816F-41D0-AAC0-9BF4FEBC753E}" type="datetimeFigureOut">
               <a:rPr lang="es-ES" smtClean="0"/>
-              <a:t>16/12/2021</a:t>
+              <a:t>08/02/2022</a:t>
             </a:fld>
             <a:endParaRPr lang="es-ES"/>
           </a:p>
@@ -2665,7 +2665,7 @@
           <a:p>
             <a:fld id="{7A847CFC-816F-41D0-AAC0-9BF4FEBC753E}" type="datetimeFigureOut">
               <a:rPr lang="es-ES" smtClean="0"/>
-              <a:t>16/12/2021</a:t>
+              <a:t>08/02/2022</a:t>
             </a:fld>
             <a:endParaRPr lang="es-ES"/>
           </a:p>
@@ -3422,11 +3422,7 @@
           <a:p>
             <a:r>
               <a:rPr lang="es-ES" sz="1300" b="1" dirty="0" smtClean="0"/>
-              <a:t>pd</a:t>
-            </a:r>
-            <a:r>
-              <a:rPr lang="es-ES" sz="1300" b="1" dirty="0" smtClean="0"/>
-              <a:t>_table_complete.py</a:t>
+              <a:t>pd_table_complete.py</a:t>
             </a:r>
             <a:endParaRPr lang="en-US" sz="1300" b="1" dirty="0"/>
           </a:p>
@@ -3740,11 +3736,7 @@
           <a:p>
             <a:r>
               <a:rPr lang="es-ES" sz="1300" b="1" dirty="0" smtClean="0"/>
-              <a:t>pd</a:t>
-            </a:r>
-            <a:r>
-              <a:rPr lang="es-ES" sz="1300" b="1" dirty="0" smtClean="0"/>
-              <a:t>_table_selection.py</a:t>
+              <a:t>pd_table_selection.py</a:t>
             </a:r>
             <a:endParaRPr lang="en-US" sz="1300" b="1" dirty="0"/>
           </a:p>
@@ -3840,11 +3832,7 @@
           <a:p>
             <a:r>
               <a:rPr lang="es-ES" sz="1300" b="1" dirty="0" smtClean="0"/>
-              <a:t>pd</a:t>
-            </a:r>
-            <a:r>
-              <a:rPr lang="es-ES" sz="1300" b="1" dirty="0" smtClean="0"/>
-              <a:t>_MALDI_match.py</a:t>
+              <a:t>pd_MALDI_match.py</a:t>
             </a:r>
             <a:endParaRPr lang="en-US" sz="1300" b="1" dirty="0"/>
           </a:p>
@@ -4211,24 +4199,21 @@
         <p:nvCxnSpPr>
           <p:cNvPr id="54" name="53 Conector recto de flecha"/>
           <p:cNvCxnSpPr>
-            <a:stCxn id="44" idx="1"/>
+            <a:stCxn id="58" idx="1"/>
           </p:cNvCxnSpPr>
           <p:nvPr/>
         </p:nvCxnSpPr>
         <p:spPr>
           <a:xfrm flipH="1" flipV="1">
-            <a:off x="3419872" y="2079940"/>
-            <a:ext cx="1970070" cy="1293021"/>
+            <a:off x="3419872" y="2095522"/>
+            <a:ext cx="1799549" cy="2375853"/>
           </a:xfrm>
           <a:prstGeom prst="straightConnector1">
             <a:avLst/>
           </a:prstGeom>
           <a:ln>
             <a:solidFill>
-              <a:schemeClr val="accent2">
-                <a:lumMod val="60000"/>
-                <a:lumOff val="40000"/>
-              </a:schemeClr>
+              <a:schemeClr val="tx1"/>
             </a:solidFill>
             <a:tailEnd type="arrow"/>
           </a:ln>
@@ -4258,8 +4243,8 @@
         </p:nvCxnSpPr>
         <p:spPr>
           <a:xfrm flipV="1">
-            <a:off x="3346701" y="2728808"/>
-            <a:ext cx="966442" cy="717125"/>
+            <a:off x="3346701" y="3235732"/>
+            <a:ext cx="865259" cy="210201"/>
           </a:xfrm>
           <a:prstGeom prst="straightConnector1">
             <a:avLst/>
@@ -4295,7 +4280,7 @@
         </p:nvSpPr>
         <p:spPr>
           <a:xfrm>
-            <a:off x="6220460" y="4293096"/>
+            <a:off x="6220460" y="5385410"/>
             <a:ext cx="1872208" cy="292388"/>
           </a:xfrm>
           <a:prstGeom prst="rect">
@@ -4327,8 +4312,8 @@
         </p:nvCxnSpPr>
         <p:spPr>
           <a:xfrm>
-            <a:off x="3419872" y="2143418"/>
-            <a:ext cx="2800588" cy="2295872"/>
+            <a:off x="3131840" y="2850758"/>
+            <a:ext cx="3088620" cy="2680846"/>
           </a:xfrm>
           <a:prstGeom prst="straightConnector1">
             <a:avLst/>
@@ -4370,7 +4355,7 @@
         <p:spPr>
           <a:xfrm flipH="1">
             <a:off x="7156564" y="3058436"/>
-            <a:ext cx="1100420" cy="1234660"/>
+            <a:ext cx="1100420" cy="2326974"/>
           </a:xfrm>
           <a:prstGeom prst="straightConnector1">
             <a:avLst/>
@@ -4405,7 +4390,7 @@
         </p:nvSpPr>
         <p:spPr>
           <a:xfrm>
-            <a:off x="7873528" y="3548849"/>
+            <a:off x="8111833" y="3548849"/>
             <a:ext cx="720080" cy="307777"/>
           </a:xfrm>
           <a:prstGeom prst="rect">
@@ -4435,7 +4420,7 @@
         </p:nvCxnSpPr>
         <p:spPr>
           <a:xfrm>
-            <a:off x="6960840" y="4585484"/>
+            <a:off x="6960840" y="5677798"/>
             <a:ext cx="0" cy="211668"/>
           </a:xfrm>
           <a:prstGeom prst="straightConnector1">
@@ -4474,7 +4459,7 @@
         </p:nvSpPr>
         <p:spPr>
           <a:xfrm>
-            <a:off x="6122598" y="4941168"/>
+            <a:off x="6122598" y="6033482"/>
             <a:ext cx="1676483" cy="707886"/>
           </a:xfrm>
           <a:prstGeom prst="rect">
@@ -4547,6 +4532,182 @@
             <a:solidFill>
               <a:schemeClr val="tx1"/>
             </a:solidFill>
+            <a:tailEnd type="arrow"/>
+          </a:ln>
+        </p:spPr>
+        <p:style>
+          <a:lnRef idx="1">
+            <a:schemeClr val="accent1"/>
+          </a:lnRef>
+          <a:fillRef idx="0">
+            <a:schemeClr val="accent1"/>
+          </a:fillRef>
+          <a:effectRef idx="0">
+            <a:schemeClr val="accent1"/>
+          </a:effectRef>
+          <a:fontRef idx="minor">
+            <a:schemeClr val="tx1"/>
+          </a:fontRef>
+        </p:style>
+      </p:cxnSp>
+      <p:sp>
+        <p:nvSpPr>
+          <p:cNvPr id="52" name="51 CuadroTexto"/>
+          <p:cNvSpPr txBox="1"/>
+          <p:nvPr/>
+        </p:nvSpPr>
+        <p:spPr>
+          <a:xfrm>
+            <a:off x="5467504" y="3784684"/>
+            <a:ext cx="1505910" cy="292388"/>
+          </a:xfrm>
+          <a:prstGeom prst="rect">
+            <a:avLst/>
+          </a:prstGeom>
+          <a:noFill/>
+        </p:spPr>
+        <p:txBody>
+          <a:bodyPr wrap="square" rtlCol="0">
+            <a:spAutoFit/>
+          </a:bodyPr>
+          <a:lstStyle/>
+          <a:p>
+            <a:r>
+              <a:rPr lang="es-ES" sz="1300" b="1" dirty="0" smtClean="0"/>
+              <a:t>Protein_signals.py</a:t>
+            </a:r>
+            <a:endParaRPr lang="en-US" sz="1300" b="1" dirty="0"/>
+          </a:p>
+        </p:txBody>
+      </p:sp>
+      <p:cxnSp>
+        <p:nvCxnSpPr>
+          <p:cNvPr id="55" name="54 Conector recto de flecha"/>
+          <p:cNvCxnSpPr/>
+          <p:nvPr/>
+        </p:nvCxnSpPr>
+        <p:spPr>
+          <a:xfrm>
+            <a:off x="6220461" y="3577372"/>
+            <a:ext cx="0" cy="122602"/>
+          </a:xfrm>
+          <a:prstGeom prst="straightConnector1">
+            <a:avLst/>
+          </a:prstGeom>
+          <a:ln>
+            <a:solidFill>
+              <a:schemeClr val="tx1"/>
+            </a:solidFill>
+            <a:tailEnd type="arrow"/>
+          </a:ln>
+        </p:spPr>
+        <p:style>
+          <a:lnRef idx="1">
+            <a:schemeClr val="accent1"/>
+          </a:lnRef>
+          <a:fillRef idx="0">
+            <a:schemeClr val="accent1"/>
+          </a:fillRef>
+          <a:effectRef idx="0">
+            <a:schemeClr val="accent1"/>
+          </a:effectRef>
+          <a:fontRef idx="minor">
+            <a:schemeClr val="tx1"/>
+          </a:fontRef>
+        </p:style>
+      </p:cxnSp>
+      <p:cxnSp>
+        <p:nvCxnSpPr>
+          <p:cNvPr id="57" name="56 Conector recto de flecha"/>
+          <p:cNvCxnSpPr/>
+          <p:nvPr/>
+        </p:nvCxnSpPr>
+        <p:spPr>
+          <a:xfrm>
+            <a:off x="6228184" y="4121934"/>
+            <a:ext cx="0" cy="122602"/>
+          </a:xfrm>
+          <a:prstGeom prst="straightConnector1">
+            <a:avLst/>
+          </a:prstGeom>
+          <a:ln>
+            <a:solidFill>
+              <a:schemeClr val="tx1"/>
+            </a:solidFill>
+            <a:tailEnd type="arrow"/>
+          </a:ln>
+        </p:spPr>
+        <p:style>
+          <a:lnRef idx="1">
+            <a:schemeClr val="accent1"/>
+          </a:lnRef>
+          <a:fillRef idx="0">
+            <a:schemeClr val="accent1"/>
+          </a:fillRef>
+          <a:effectRef idx="0">
+            <a:schemeClr val="accent1"/>
+          </a:effectRef>
+          <a:fontRef idx="minor">
+            <a:schemeClr val="tx1"/>
+          </a:fontRef>
+        </p:style>
+      </p:cxnSp>
+      <p:sp>
+        <p:nvSpPr>
+          <p:cNvPr id="58" name="57 CuadroTexto"/>
+          <p:cNvSpPr txBox="1"/>
+          <p:nvPr/>
+        </p:nvSpPr>
+        <p:spPr>
+          <a:xfrm>
+            <a:off x="5219421" y="4271320"/>
+            <a:ext cx="2002077" cy="400110"/>
+          </a:xfrm>
+          <a:prstGeom prst="rect">
+            <a:avLst/>
+          </a:prstGeom>
+          <a:noFill/>
+        </p:spPr>
+        <p:txBody>
+          <a:bodyPr wrap="square" rtlCol="0">
+            <a:spAutoFit/>
+          </a:bodyPr>
+          <a:lstStyle/>
+          <a:p>
+            <a:pPr algn="ctr"/>
+            <a:r>
+              <a:rPr lang="en-US" sz="1000" dirty="0" smtClean="0"/>
+              <a:t> </a:t>
+            </a:r>
+            <a:r>
+              <a:rPr lang="en-US" sz="1000" dirty="0"/>
+              <a:t>Search for signals corresponding to each protein code of interest</a:t>
+            </a:r>
+            <a:endParaRPr lang="en-US" sz="1000" dirty="0" smtClean="0"/>
+          </a:p>
+        </p:txBody>
+      </p:sp>
+      <p:cxnSp>
+        <p:nvCxnSpPr>
+          <p:cNvPr id="59" name="58 Conector recto de flecha"/>
+          <p:cNvCxnSpPr>
+            <a:stCxn id="12" idx="3"/>
+          </p:cNvCxnSpPr>
+          <p:nvPr/>
+        </p:nvCxnSpPr>
+        <p:spPr>
+          <a:xfrm>
+            <a:off x="3346701" y="3445933"/>
+            <a:ext cx="1081283" cy="559131"/>
+          </a:xfrm>
+          <a:prstGeom prst="straightConnector1">
+            <a:avLst/>
+          </a:prstGeom>
+          <a:ln>
+            <a:solidFill>
+              <a:schemeClr val="tx1"/>
+            </a:solidFill>
+            <a:prstDash val="sysDot"/>
             <a:tailEnd type="arrow"/>
           </a:ln>
         </p:spPr>

</xml_diff>